<commit_message>
Updated slides for class 8
</commit_message>
<xml_diff>
--- a/slides/Pythonlearn-08-HackingAndSharing.pptx
+++ b/slides/Pythonlearn-08-HackingAndSharing.pptx
@@ -4608,38 +4608,54 @@
                   <a:schemeClr val="bg1"/>
                 </a:solidFill>
               </a:rPr>
-              <a:t>2 – From the command line, type “python3 –m pip install </a:t>
+              <a:t>2 – From the command line, type “</a:t>
+            </a:r>
+            <a:r>
+              <a:rPr lang="en-US" sz="3000" dirty="0">
+                <a:solidFill>
+                  <a:srgbClr val="00FF00"/>
+                </a:solidFill>
+              </a:rPr>
+              <a:t>python3 –m pip install </a:t>
             </a:r>
             <a:r>
               <a:rPr lang="en-US" sz="3000" dirty="0" err="1">
                 <a:solidFill>
+                  <a:srgbClr val="00FF00"/>
+                </a:solidFill>
+              </a:rPr>
+              <a:t>pygame</a:t>
+            </a:r>
+            <a:r>
+              <a:rPr lang="en-US" sz="3000" dirty="0">
+                <a:solidFill>
                   <a:schemeClr val="bg1"/>
                 </a:solidFill>
               </a:rPr>
-              <a:t>pygame</a:t>
-            </a:r>
+              <a:t>”</a:t>
+            </a:r>
+          </a:p>
+          <a:p>
             <a:r>
               <a:rPr lang="en-US" sz="3000" dirty="0">
                 <a:solidFill>
                   <a:schemeClr val="bg1"/>
                 </a:solidFill>
               </a:rPr>
-              <a:t>”</a:t>
-            </a:r>
-          </a:p>
-          <a:p>
+              <a:t>3 – Teach your friends who to run “</a:t>
+            </a:r>
             <a:r>
               <a:rPr lang="en-US" sz="3000" dirty="0">
                 <a:solidFill>
-                  <a:schemeClr val="bg1"/>
-                </a:solidFill>
-              </a:rPr>
-              <a:t>3 – Teach your friends who to run “python3 </a:t>
+                  <a:srgbClr val="00FF00"/>
+                </a:solidFill>
+              </a:rPr>
+              <a:t>python3 </a:t>
             </a:r>
             <a:r>
               <a:rPr lang="en-US" sz="3000" dirty="0" err="1">
                 <a:solidFill>
-                  <a:schemeClr val="bg1"/>
+                  <a:srgbClr val="00FF00"/>
                 </a:solidFill>
               </a:rPr>
               <a:t>mygame.py</a:t>
@@ -4802,6 +4818,229 @@
           </a:p>
         </p:txBody>
       </p:sp>
+      <p:cxnSp>
+        <p:nvCxnSpPr>
+          <p:cNvPr id="4" name="Straight Arrow Connector 3">
+            <a:extLst>
+              <a:ext uri="{FF2B5EF4-FFF2-40B4-BE49-F238E27FC236}">
+                <a16:creationId xmlns:a16="http://schemas.microsoft.com/office/drawing/2014/main" id="{886FD645-0A36-3D40-A854-78E75A576A9E}"/>
+              </a:ext>
+            </a:extLst>
+          </p:cNvPr>
+          <p:cNvCxnSpPr/>
+          <p:nvPr/>
+        </p:nvCxnSpPr>
+        <p:spPr>
+          <a:xfrm>
+            <a:off x="1717903" y="7065818"/>
+            <a:ext cx="2576945" cy="0"/>
+          </a:xfrm>
+          <a:prstGeom prst="straightConnector1">
+            <a:avLst/>
+          </a:prstGeom>
+          <a:ln w="76200">
+            <a:solidFill>
+              <a:srgbClr val="FF0000"/>
+            </a:solidFill>
+            <a:tailEnd type="triangle"/>
+          </a:ln>
+        </p:spPr>
+        <p:style>
+          <a:lnRef idx="1">
+            <a:schemeClr val="accent1"/>
+          </a:lnRef>
+          <a:fillRef idx="0">
+            <a:schemeClr val="accent1"/>
+          </a:fillRef>
+          <a:effectRef idx="0">
+            <a:schemeClr val="accent1"/>
+          </a:effectRef>
+          <a:fontRef idx="minor">
+            <a:schemeClr val="tx1"/>
+          </a:fontRef>
+        </p:style>
+      </p:cxnSp>
+      <p:sp>
+        <p:nvSpPr>
+          <p:cNvPr id="5" name="Rectangle 4">
+            <a:extLst>
+              <a:ext uri="{FF2B5EF4-FFF2-40B4-BE49-F238E27FC236}">
+                <a16:creationId xmlns:a16="http://schemas.microsoft.com/office/drawing/2014/main" id="{CA88E0D0-9149-A048-9D00-4BDA40A4CEC5}"/>
+              </a:ext>
+            </a:extLst>
+          </p:cNvPr>
+          <p:cNvSpPr/>
+          <p:nvPr/>
+        </p:nvSpPr>
+        <p:spPr>
+          <a:xfrm>
+            <a:off x="4565119" y="6751923"/>
+            <a:ext cx="6614311" cy="553998"/>
+          </a:xfrm>
+          <a:prstGeom prst="rect">
+            <a:avLst/>
+          </a:prstGeom>
+        </p:spPr>
+        <p:txBody>
+          <a:bodyPr wrap="none">
+            <a:spAutoFit/>
+          </a:bodyPr>
+          <a:lstStyle/>
+          <a:p>
+            <a:r>
+              <a:rPr lang="en-US" sz="3000" dirty="0">
+                <a:solidFill>
+                  <a:schemeClr val="bg1"/>
+                </a:solidFill>
+                <a:hlinkClick r:id="rId3"/>
+              </a:rPr>
+              <a:t>https://inventwithpython.com/pygame/</a:t>
+            </a:r>
+            <a:endParaRPr lang="en-US" sz="3000" dirty="0">
+              <a:solidFill>
+                <a:schemeClr val="bg1"/>
+              </a:solidFill>
+            </a:endParaRPr>
+          </a:p>
+        </p:txBody>
+      </p:sp>
+      <p:cxnSp>
+        <p:nvCxnSpPr>
+          <p:cNvPr id="7" name="Straight Arrow Connector 6">
+            <a:extLst>
+              <a:ext uri="{FF2B5EF4-FFF2-40B4-BE49-F238E27FC236}">
+                <a16:creationId xmlns:a16="http://schemas.microsoft.com/office/drawing/2014/main" id="{3F5F48F0-3A22-0545-BA85-73DD346D2404}"/>
+              </a:ext>
+            </a:extLst>
+          </p:cNvPr>
+          <p:cNvCxnSpPr>
+            <a:cxnSpLocks/>
+          </p:cNvCxnSpPr>
+          <p:nvPr/>
+        </p:nvCxnSpPr>
+        <p:spPr>
+          <a:xfrm flipH="1">
+            <a:off x="11449701" y="7028922"/>
+            <a:ext cx="2496983" cy="36896"/>
+          </a:xfrm>
+          <a:prstGeom prst="straightConnector1">
+            <a:avLst/>
+          </a:prstGeom>
+          <a:ln w="76200">
+            <a:solidFill>
+              <a:srgbClr val="FF0000"/>
+            </a:solidFill>
+            <a:tailEnd type="triangle"/>
+          </a:ln>
+        </p:spPr>
+        <p:style>
+          <a:lnRef idx="1">
+            <a:schemeClr val="accent1"/>
+          </a:lnRef>
+          <a:fillRef idx="0">
+            <a:schemeClr val="accent1"/>
+          </a:fillRef>
+          <a:effectRef idx="0">
+            <a:schemeClr val="accent1"/>
+          </a:effectRef>
+          <a:fontRef idx="minor">
+            <a:schemeClr val="tx1"/>
+          </a:fontRef>
+        </p:style>
+      </p:cxnSp>
+      <p:sp>
+        <p:nvSpPr>
+          <p:cNvPr id="8" name="TextBox 7">
+            <a:extLst>
+              <a:ext uri="{FF2B5EF4-FFF2-40B4-BE49-F238E27FC236}">
+                <a16:creationId xmlns:a16="http://schemas.microsoft.com/office/drawing/2014/main" id="{DBE9BE45-48F0-F648-AFF4-B637D5C5D0DE}"/>
+              </a:ext>
+            </a:extLst>
+          </p:cNvPr>
+          <p:cNvSpPr txBox="1"/>
+          <p:nvPr/>
+        </p:nvSpPr>
+        <p:spPr>
+          <a:xfrm flipH="1">
+            <a:off x="5949954" y="8127125"/>
+            <a:ext cx="3844639" cy="553998"/>
+          </a:xfrm>
+          <a:prstGeom prst="rect">
+            <a:avLst/>
+          </a:prstGeom>
+          <a:noFill/>
+        </p:spPr>
+        <p:txBody>
+          <a:bodyPr wrap="square" rtlCol="0">
+            <a:spAutoFit/>
+          </a:bodyPr>
+          <a:lstStyle/>
+          <a:p>
+            <a:r>
+              <a:rPr lang="en-US" sz="3000" dirty="0">
+                <a:solidFill>
+                  <a:schemeClr val="bg1"/>
+                </a:solidFill>
+              </a:rPr>
+              <a:t>Keep Learning Here!</a:t>
+            </a:r>
+            <a:r>
+              <a:rPr lang="en-US" dirty="0">
+                <a:solidFill>
+                  <a:schemeClr val="bg1"/>
+                </a:solidFill>
+              </a:rPr>
+              <a:t> </a:t>
+            </a:r>
+          </a:p>
+        </p:txBody>
+      </p:sp>
+      <p:cxnSp>
+        <p:nvCxnSpPr>
+          <p:cNvPr id="10" name="Straight Arrow Connector 9">
+            <a:extLst>
+              <a:ext uri="{FF2B5EF4-FFF2-40B4-BE49-F238E27FC236}">
+                <a16:creationId xmlns:a16="http://schemas.microsoft.com/office/drawing/2014/main" id="{951D1232-F914-1248-BFCB-DBC4EDA591D4}"/>
+              </a:ext>
+            </a:extLst>
+          </p:cNvPr>
+          <p:cNvCxnSpPr>
+            <a:cxnSpLocks/>
+            <a:stCxn id="8" idx="0"/>
+            <a:endCxn id="5" idx="2"/>
+          </p:cNvCxnSpPr>
+          <p:nvPr/>
+        </p:nvCxnSpPr>
+        <p:spPr>
+          <a:xfrm flipV="1">
+            <a:off x="7872273" y="7305921"/>
+            <a:ext cx="2" cy="821204"/>
+          </a:xfrm>
+          <a:prstGeom prst="straightConnector1">
+            <a:avLst/>
+          </a:prstGeom>
+          <a:ln w="76200">
+            <a:solidFill>
+              <a:srgbClr val="FF0000"/>
+            </a:solidFill>
+            <a:tailEnd type="triangle"/>
+          </a:ln>
+        </p:spPr>
+        <p:style>
+          <a:lnRef idx="1">
+            <a:schemeClr val="accent1"/>
+          </a:lnRef>
+          <a:fillRef idx="0">
+            <a:schemeClr val="accent1"/>
+          </a:fillRef>
+          <a:effectRef idx="0">
+            <a:schemeClr val="accent1"/>
+          </a:effectRef>
+          <a:fontRef idx="minor">
+            <a:schemeClr val="tx1"/>
+          </a:fontRef>
+        </p:style>
+      </p:cxnSp>
     </p:spTree>
     <p:extLst>
       <p:ext uri="{BB962C8B-B14F-4D97-AF65-F5344CB8AC3E}">
@@ -6543,7 +6782,13 @@
           <p:nvPr/>
         </p:nvPicPr>
         <p:blipFill>
-          <a:blip r:embed="rId3"/>
+          <a:blip r:embed="rId3" cstate="email">
+            <a:extLst>
+              <a:ext uri="{28A0092B-C50C-407E-A947-70E740481C1C}">
+                <a14:useLocalDpi xmlns:a14="http://schemas.microsoft.com/office/drawing/2010/main"/>
+              </a:ext>
+            </a:extLst>
+          </a:blip>
           <a:stretch>
             <a:fillRect/>
           </a:stretch>
@@ -6779,7 +7024,13 @@
           <p:nvPr/>
         </p:nvPicPr>
         <p:blipFill>
-          <a:blip r:embed="rId3"/>
+          <a:blip r:embed="rId3" cstate="email">
+            <a:extLst>
+              <a:ext uri="{28A0092B-C50C-407E-A947-70E740481C1C}">
+                <a14:useLocalDpi xmlns:a14="http://schemas.microsoft.com/office/drawing/2010/main"/>
+              </a:ext>
+            </a:extLst>
+          </a:blip>
           <a:stretch>
             <a:fillRect/>
           </a:stretch>

</xml_diff>